<commit_message>
Update in the presentation
</commit_message>
<xml_diff>
--- a/Network Project.pptx
+++ b/Network Project.pptx
@@ -118,6 +118,11 @@
       </a:defRPr>
     </a:lvl9pPr>
   </p:defaultTextStyle>
+  <p:extLst>
+    <p:ext uri="{EFAFB233-063F-42B5-8137-9DF3F51BA10A}">
+      <p15:sldGuideLst xmlns:p15="http://schemas.microsoft.com/office/powerpoint/2012/main"/>
+    </p:ext>
+  </p:extLst>
 </p:presentation>
 </file>
 
@@ -6626,6 +6631,14 @@
 <file path=ppt/slides/slide14.xml><?xml version="1.0" encoding="utf-8"?>
 <p:sld xmlns:a="http://schemas.openxmlformats.org/drawingml/2006/main" xmlns:r="http://schemas.openxmlformats.org/officeDocument/2006/relationships" xmlns:p="http://schemas.openxmlformats.org/presentationml/2006/main">
   <p:cSld>
+    <p:bg>
+      <p:bgPr>
+        <a:solidFill>
+          <a:schemeClr val="bg1"/>
+        </a:solidFill>
+        <a:effectLst/>
+      </p:bgPr>
+    </p:bg>
     <p:spTree>
       <p:nvGrpSpPr>
         <p:cNvPr id="1" name=""/>
@@ -6640,6 +6653,210 @@
           <a:chExt cx="0" cy="0"/>
         </a:xfrm>
       </p:grpSpPr>
+      <p:sp useBgFill="1">
+        <p:nvSpPr>
+          <p:cNvPr id="8" name="Rectangle 7">
+            <a:extLst>
+              <a:ext uri="{FF2B5EF4-FFF2-40B4-BE49-F238E27FC236}">
+                <a16:creationId xmlns:a16="http://schemas.microsoft.com/office/drawing/2014/main" id="{D160B463-41E9-4323-AE6D-30E67F2C7227}"/>
+              </a:ext>
+              <a:ext uri="{C183D7F6-B498-43B3-948B-1728B52AA6E4}">
+                <adec:decorative xmlns:adec="http://schemas.microsoft.com/office/drawing/2017/decorative" val="1"/>
+              </a:ext>
+            </a:extLst>
+          </p:cNvPr>
+          <p:cNvSpPr>
+            <a:spLocks noGrp="1" noRot="1" noChangeAspect="1" noMove="1" noResize="1" noEditPoints="1" noAdjustHandles="1" noChangeArrowheads="1" noChangeShapeType="1" noTextEdit="1"/>
+          </p:cNvSpPr>
+          <p:nvPr>
+            <p:extLst>
+              <p:ext uri="{386F3935-93C4-4BCD-93E2-E3B085C9AB24}">
+                <p16:designElem xmlns:p16="http://schemas.microsoft.com/office/powerpoint/2015/main" val="1"/>
+              </p:ext>
+            </p:extLst>
+          </p:nvPr>
+        </p:nvSpPr>
+        <p:spPr>
+          <a:xfrm>
+            <a:off x="0" y="0"/>
+            <a:ext cx="12192000" cy="6858000"/>
+          </a:xfrm>
+          <a:prstGeom prst="rect">
+            <a:avLst/>
+          </a:prstGeom>
+          <a:ln>
+            <a:noFill/>
+          </a:ln>
+        </p:spPr>
+        <p:style>
+          <a:lnRef idx="2">
+            <a:schemeClr val="accent1">
+              <a:shade val="50000"/>
+            </a:schemeClr>
+          </a:lnRef>
+          <a:fillRef idx="1">
+            <a:schemeClr val="accent1"/>
+          </a:fillRef>
+          <a:effectRef idx="0">
+            <a:schemeClr val="accent1"/>
+          </a:effectRef>
+          <a:fontRef idx="minor">
+            <a:schemeClr val="lt1"/>
+          </a:fontRef>
+        </p:style>
+        <p:txBody>
+          <a:bodyPr rtlCol="0" anchor="ctr"/>
+          <a:lstStyle/>
+          <a:p>
+            <a:pPr algn="ctr"/>
+            <a:endParaRPr lang="en-US"/>
+          </a:p>
+        </p:txBody>
+      </p:sp>
+      <p:sp>
+        <p:nvSpPr>
+          <p:cNvPr id="10" name="Rectangle 9">
+            <a:extLst>
+              <a:ext uri="{FF2B5EF4-FFF2-40B4-BE49-F238E27FC236}">
+                <a16:creationId xmlns:a16="http://schemas.microsoft.com/office/drawing/2014/main" id="{188A358F-F8B2-4FD2-99F3-7CA83358500E}"/>
+              </a:ext>
+              <a:ext uri="{C183D7F6-B498-43B3-948B-1728B52AA6E4}">
+                <adec:decorative xmlns:adec="http://schemas.microsoft.com/office/drawing/2017/decorative" val="1"/>
+              </a:ext>
+            </a:extLst>
+          </p:cNvPr>
+          <p:cNvSpPr>
+            <a:spLocks noGrp="1" noRot="1" noChangeAspect="1" noMove="1" noResize="1" noEditPoints="1" noAdjustHandles="1" noChangeArrowheads="1" noChangeShapeType="1" noTextEdit="1"/>
+          </p:cNvSpPr>
+          <p:nvPr>
+            <p:extLst>
+              <p:ext uri="{386F3935-93C4-4BCD-93E2-E3B085C9AB24}">
+                <p16:designElem xmlns:p16="http://schemas.microsoft.com/office/powerpoint/2015/main" val="1"/>
+              </p:ext>
+            </p:extLst>
+          </p:nvPr>
+        </p:nvSpPr>
+        <p:spPr>
+          <a:xfrm>
+            <a:off x="0" y="0"/>
+            <a:ext cx="12192000" cy="6858000"/>
+          </a:xfrm>
+          <a:prstGeom prst="rect">
+            <a:avLst/>
+          </a:prstGeom>
+          <a:gradFill flip="none" rotWithShape="1">
+            <a:gsLst>
+              <a:gs pos="10000">
+                <a:schemeClr val="accent5"/>
+              </a:gs>
+              <a:gs pos="90000">
+                <a:schemeClr val="accent1"/>
+              </a:gs>
+              <a:gs pos="70000">
+                <a:schemeClr val="accent2"/>
+              </a:gs>
+              <a:gs pos="30000">
+                <a:schemeClr val="accent4"/>
+              </a:gs>
+              <a:gs pos="50000">
+                <a:schemeClr val="accent3">
+                  <a:lumMod val="60000"/>
+                  <a:lumOff val="40000"/>
+                </a:schemeClr>
+              </a:gs>
+            </a:gsLst>
+            <a:lin ang="7200000" scaled="0"/>
+            <a:tileRect/>
+          </a:gradFill>
+          <a:ln>
+            <a:noFill/>
+          </a:ln>
+        </p:spPr>
+        <p:style>
+          <a:lnRef idx="2">
+            <a:schemeClr val="accent1">
+              <a:shade val="50000"/>
+            </a:schemeClr>
+          </a:lnRef>
+          <a:fillRef idx="1">
+            <a:schemeClr val="accent1"/>
+          </a:fillRef>
+          <a:effectRef idx="0">
+            <a:schemeClr val="accent1"/>
+          </a:effectRef>
+          <a:fontRef idx="minor">
+            <a:schemeClr val="lt1"/>
+          </a:fontRef>
+        </p:style>
+        <p:txBody>
+          <a:bodyPr rtlCol="0" anchor="ctr"/>
+          <a:lstStyle/>
+          <a:p>
+            <a:pPr algn="ctr"/>
+            <a:endParaRPr lang="en-US"/>
+          </a:p>
+        </p:txBody>
+      </p:sp>
+      <p:sp useBgFill="1">
+        <p:nvSpPr>
+          <p:cNvPr id="12" name="Rectangle 11">
+            <a:extLst>
+              <a:ext uri="{FF2B5EF4-FFF2-40B4-BE49-F238E27FC236}">
+                <a16:creationId xmlns:a16="http://schemas.microsoft.com/office/drawing/2014/main" id="{2CCE2735-7843-4DC6-81F5-6366AB3EFF63}"/>
+              </a:ext>
+              <a:ext uri="{C183D7F6-B498-43B3-948B-1728B52AA6E4}">
+                <adec:decorative xmlns:adec="http://schemas.microsoft.com/office/drawing/2017/decorative" val="1"/>
+              </a:ext>
+            </a:extLst>
+          </p:cNvPr>
+          <p:cNvSpPr>
+            <a:spLocks noGrp="1" noRot="1" noChangeAspect="1" noMove="1" noResize="1" noEditPoints="1" noAdjustHandles="1" noChangeArrowheads="1" noChangeShapeType="1" noTextEdit="1"/>
+          </p:cNvSpPr>
+          <p:nvPr>
+            <p:extLst>
+              <p:ext uri="{386F3935-93C4-4BCD-93E2-E3B085C9AB24}">
+                <p16:designElem xmlns:p16="http://schemas.microsoft.com/office/powerpoint/2015/main" val="1"/>
+              </p:ext>
+            </p:extLst>
+          </p:nvPr>
+        </p:nvSpPr>
+        <p:spPr>
+          <a:xfrm>
+            <a:off x="1071372" y="1065276"/>
+            <a:ext cx="10049256" cy="4727448"/>
+          </a:xfrm>
+          <a:prstGeom prst="rect">
+            <a:avLst/>
+          </a:prstGeom>
+          <a:ln>
+            <a:noFill/>
+          </a:ln>
+        </p:spPr>
+        <p:style>
+          <a:lnRef idx="2">
+            <a:schemeClr val="accent1">
+              <a:shade val="50000"/>
+            </a:schemeClr>
+          </a:lnRef>
+          <a:fillRef idx="1">
+            <a:schemeClr val="accent1"/>
+          </a:fillRef>
+          <a:effectRef idx="0">
+            <a:schemeClr val="accent1"/>
+          </a:effectRef>
+          <a:fontRef idx="minor">
+            <a:schemeClr val="lt1"/>
+          </a:fontRef>
+        </p:style>
+        <p:txBody>
+          <a:bodyPr rtlCol="0" anchor="ctr"/>
+          <a:lstStyle/>
+          <a:p>
+            <a:pPr algn="ctr"/>
+            <a:endParaRPr lang="en-US"/>
+          </a:p>
+        </p:txBody>
+      </p:sp>
       <p:sp>
         <p:nvSpPr>
           <p:cNvPr id="2" name="Title 1">
@@ -6656,9 +6873,16 @@
             <p:ph type="title"/>
           </p:nvPr>
         </p:nvSpPr>
-        <p:spPr/>
+        <p:spPr>
+          <a:xfrm>
+            <a:off x="1830324" y="1790175"/>
+            <a:ext cx="8531352" cy="1072843"/>
+          </a:xfrm>
+        </p:spPr>
         <p:txBody>
-          <a:bodyPr/>
+          <a:bodyPr>
+            <a:normAutofit/>
+          </a:bodyPr>
           <a:lstStyle/>
           <a:p>
             <a:r>
@@ -6684,12 +6908,31 @@
             <p:ph idx="1"/>
           </p:nvPr>
         </p:nvSpPr>
-        <p:spPr/>
+        <p:spPr>
+          <a:xfrm>
+            <a:off x="1830322" y="2970223"/>
+            <a:ext cx="8531353" cy="2194124"/>
+          </a:xfrm>
+        </p:spPr>
         <p:txBody>
-          <a:bodyPr/>
+          <a:bodyPr>
+            <a:normAutofit/>
+          </a:bodyPr>
           <a:lstStyle/>
           <a:p>
-            <a:endParaRPr lang="en-US"/>
+            <a:pPr marL="0" indent="0">
+              <a:buNone/>
+            </a:pPr>
+            <a:r>
+              <a:rPr lang="en-US" dirty="0">
+                <a:hlinkClick r:id="rId2"/>
+              </a:rPr>
+              <a:t>https://github.com/ManarShahin48/Rock-Paper-Scissor-Game</a:t>
+            </a:r>
+            <a:endParaRPr lang="en-US" dirty="0"/>
+          </a:p>
+          <a:p>
+            <a:endParaRPr lang="en-US" dirty="0"/>
           </a:p>
         </p:txBody>
       </p:sp>

</xml_diff>

<commit_message>
Last update in the presentation
</commit_message>
<xml_diff>
--- a/Network Project.pptx
+++ b/Network Project.pptx
@@ -18,8 +18,9 @@
     <p:sldId id="266" r:id="rId12"/>
     <p:sldId id="269" r:id="rId13"/>
     <p:sldId id="270" r:id="rId14"/>
-    <p:sldId id="271" r:id="rId15"/>
-    <p:sldId id="257" r:id="rId16"/>
+    <p:sldId id="272" r:id="rId15"/>
+    <p:sldId id="271" r:id="rId16"/>
+    <p:sldId id="257" r:id="rId17"/>
   </p:sldIdLst>
   <p:sldSz cx="12192000" cy="6858000"/>
   <p:notesSz cx="6858000" cy="9144000"/>
@@ -5318,7 +5319,7 @@
         </p:spPr>
         <p:txBody>
           <a:bodyPr>
-            <a:normAutofit fontScale="92500"/>
+            <a:normAutofit lnSpcReduction="10000"/>
           </a:bodyPr>
           <a:lstStyle/>
           <a:p>
@@ -5506,6 +5507,15 @@
               <a:buNone/>
             </a:pPr>
             <a:r>
+              <a:rPr lang="en-US" sz="1800" dirty="0">
+                <a:solidFill>
+                  <a:srgbClr val="000000"/>
+                </a:solidFill>
+                <a:latin typeface="Consolas" panose="020B0609020204030204" pitchFamily="49" charset="0"/>
+              </a:rPr>
+              <a:t>	</a:t>
+            </a:r>
+            <a:r>
               <a:rPr lang="en-US" sz="1800" b="0" dirty="0">
                 <a:solidFill>
                   <a:srgbClr val="000000"/>
@@ -5513,7 +5523,7 @@
                 <a:effectLst/>
                 <a:latin typeface="Consolas" panose="020B0609020204030204" pitchFamily="49" charset="0"/>
               </a:rPr>
-              <a:t>                text = </a:t>
+              <a:t>text = </a:t>
             </a:r>
             <a:r>
               <a:rPr lang="en-US" sz="1800" b="0" dirty="0" err="1">
@@ -5613,7 +5623,7 @@
                 <a:effectLst/>
                 <a:latin typeface="Consolas" panose="020B0609020204030204" pitchFamily="49" charset="0"/>
               </a:rPr>
-              <a:t>                text = </a:t>
+              <a:t>	text = </a:t>
             </a:r>
             <a:r>
               <a:rPr lang="en-US" sz="1800" b="0" dirty="0" err="1">
@@ -5686,6 +5696,15 @@
               <a:buNone/>
             </a:pPr>
             <a:r>
+              <a:rPr lang="en-US" sz="1800" dirty="0">
+                <a:solidFill>
+                  <a:srgbClr val="000000"/>
+                </a:solidFill>
+                <a:latin typeface="Consolas" panose="020B0609020204030204" pitchFamily="49" charset="0"/>
+              </a:rPr>
+              <a:t>	</a:t>
+            </a:r>
+            <a:r>
               <a:rPr lang="en-US" sz="1800" b="0" dirty="0">
                 <a:solidFill>
                   <a:srgbClr val="000000"/>
@@ -5693,7 +5712,7 @@
                 <a:effectLst/>
                 <a:latin typeface="Consolas" panose="020B0609020204030204" pitchFamily="49" charset="0"/>
               </a:rPr>
-              <a:t>                text = </a:t>
+              <a:t>text = </a:t>
             </a:r>
             <a:r>
               <a:rPr lang="en-US" sz="1800" b="0" dirty="0" err="1">
@@ -5749,16 +5768,6 @@
                 <a:latin typeface="Consolas" panose="020B0609020204030204" pitchFamily="49" charset="0"/>
               </a:rPr>
             </a:br>
-            <a:r>
-              <a:rPr lang="en-US" sz="1800" b="0" dirty="0">
-                <a:solidFill>
-                  <a:srgbClr val="000000"/>
-                </a:solidFill>
-                <a:effectLst/>
-                <a:latin typeface="Consolas" panose="020B0609020204030204" pitchFamily="49" charset="0"/>
-              </a:rPr>
-              <a:t>            </a:t>
-            </a:r>
             <a:r>
               <a:rPr lang="en-US" sz="1800" b="0" dirty="0" err="1">
                 <a:solidFill>
@@ -6655,6 +6664,295 @@
       </p:grpSpPr>
       <p:sp useBgFill="1">
         <p:nvSpPr>
+          <p:cNvPr id="9" name="Rectangle 8">
+            <a:extLst>
+              <a:ext uri="{FF2B5EF4-FFF2-40B4-BE49-F238E27FC236}">
+                <a16:creationId xmlns:a16="http://schemas.microsoft.com/office/drawing/2014/main" id="{ACEDC033-8DAA-4024-87F5-57430053AE84}"/>
+              </a:ext>
+              <a:ext uri="{C183D7F6-B498-43B3-948B-1728B52AA6E4}">
+                <adec:decorative xmlns:adec="http://schemas.microsoft.com/office/drawing/2017/decorative" val="1"/>
+              </a:ext>
+            </a:extLst>
+          </p:cNvPr>
+          <p:cNvSpPr>
+            <a:spLocks noGrp="1" noRot="1" noChangeAspect="1" noMove="1" noResize="1" noEditPoints="1" noAdjustHandles="1" noChangeArrowheads="1" noChangeShapeType="1" noTextEdit="1"/>
+          </p:cNvSpPr>
+          <p:nvPr>
+            <p:extLst>
+              <p:ext uri="{386F3935-93C4-4BCD-93E2-E3B085C9AB24}">
+                <p16:designElem xmlns:p16="http://schemas.microsoft.com/office/powerpoint/2015/main" val="1"/>
+              </p:ext>
+            </p:extLst>
+          </p:nvPr>
+        </p:nvSpPr>
+        <p:spPr>
+          <a:xfrm>
+            <a:off x="0" y="0"/>
+            <a:ext cx="12192000" cy="6858000"/>
+          </a:xfrm>
+          <a:prstGeom prst="rect">
+            <a:avLst/>
+          </a:prstGeom>
+          <a:ln>
+            <a:noFill/>
+          </a:ln>
+        </p:spPr>
+        <p:style>
+          <a:lnRef idx="2">
+            <a:schemeClr val="accent1">
+              <a:shade val="50000"/>
+            </a:schemeClr>
+          </a:lnRef>
+          <a:fillRef idx="1">
+            <a:schemeClr val="accent1"/>
+          </a:fillRef>
+          <a:effectRef idx="0">
+            <a:schemeClr val="accent1"/>
+          </a:effectRef>
+          <a:fontRef idx="minor">
+            <a:schemeClr val="lt1"/>
+          </a:fontRef>
+        </p:style>
+        <p:txBody>
+          <a:bodyPr rtlCol="0" anchor="ctr"/>
+          <a:lstStyle/>
+          <a:p>
+            <a:pPr algn="ctr"/>
+            <a:endParaRPr lang="en-US"/>
+          </a:p>
+        </p:txBody>
+      </p:sp>
+      <p:sp>
+        <p:nvSpPr>
+          <p:cNvPr id="11" name="Freeform: Shape 10">
+            <a:extLst>
+              <a:ext uri="{FF2B5EF4-FFF2-40B4-BE49-F238E27FC236}">
+                <a16:creationId xmlns:a16="http://schemas.microsoft.com/office/drawing/2014/main" id="{D584A691-C497-4066-927B-46560195E11F}"/>
+              </a:ext>
+              <a:ext uri="{C183D7F6-B498-43B3-948B-1728B52AA6E4}">
+                <adec:decorative xmlns:adec="http://schemas.microsoft.com/office/drawing/2017/decorative" val="1"/>
+              </a:ext>
+            </a:extLst>
+          </p:cNvPr>
+          <p:cNvSpPr>
+            <a:spLocks noGrp="1" noRot="1" noChangeAspect="1" noMove="1" noResize="1" noEditPoints="1" noAdjustHandles="1" noChangeArrowheads="1" noChangeShapeType="1" noTextEdit="1"/>
+          </p:cNvSpPr>
+          <p:nvPr>
+            <p:extLst>
+              <p:ext uri="{386F3935-93C4-4BCD-93E2-E3B085C9AB24}">
+                <p16:designElem xmlns:p16="http://schemas.microsoft.com/office/powerpoint/2015/main" val="1"/>
+              </p:ext>
+            </p:extLst>
+          </p:nvPr>
+        </p:nvSpPr>
+        <p:spPr>
+          <a:xfrm>
+            <a:off x="0" y="0"/>
+            <a:ext cx="12192000" cy="6105524"/>
+          </a:xfrm>
+          <a:custGeom>
+            <a:avLst/>
+            <a:gdLst>
+              <a:gd name="connsiteX0" fmla="*/ 0 w 12192000"/>
+              <a:gd name="connsiteY0" fmla="*/ 0 h 6105524"/>
+              <a:gd name="connsiteX1" fmla="*/ 12192000 w 12192000"/>
+              <a:gd name="connsiteY1" fmla="*/ 0 h 6105524"/>
+              <a:gd name="connsiteX2" fmla="*/ 12192000 w 12192000"/>
+              <a:gd name="connsiteY2" fmla="*/ 6105524 h 6105524"/>
+              <a:gd name="connsiteX3" fmla="*/ 11435080 w 12192000"/>
+              <a:gd name="connsiteY3" fmla="*/ 6105524 h 6105524"/>
+              <a:gd name="connsiteX4" fmla="*/ 11435080 w 12192000"/>
+              <a:gd name="connsiteY4" fmla="*/ 771523 h 6105524"/>
+              <a:gd name="connsiteX5" fmla="*/ 767080 w 12192000"/>
+              <a:gd name="connsiteY5" fmla="*/ 771523 h 6105524"/>
+              <a:gd name="connsiteX6" fmla="*/ 767080 w 12192000"/>
+              <a:gd name="connsiteY6" fmla="*/ 6105524 h 6105524"/>
+              <a:gd name="connsiteX7" fmla="*/ 0 w 12192000"/>
+              <a:gd name="connsiteY7" fmla="*/ 6105524 h 6105524"/>
+            </a:gdLst>
+            <a:ahLst/>
+            <a:cxnLst>
+              <a:cxn ang="0">
+                <a:pos x="connsiteX0" y="connsiteY0"/>
+              </a:cxn>
+              <a:cxn ang="0">
+                <a:pos x="connsiteX1" y="connsiteY1"/>
+              </a:cxn>
+              <a:cxn ang="0">
+                <a:pos x="connsiteX2" y="connsiteY2"/>
+              </a:cxn>
+              <a:cxn ang="0">
+                <a:pos x="connsiteX3" y="connsiteY3"/>
+              </a:cxn>
+              <a:cxn ang="0">
+                <a:pos x="connsiteX4" y="connsiteY4"/>
+              </a:cxn>
+              <a:cxn ang="0">
+                <a:pos x="connsiteX5" y="connsiteY5"/>
+              </a:cxn>
+              <a:cxn ang="0">
+                <a:pos x="connsiteX6" y="connsiteY6"/>
+              </a:cxn>
+              <a:cxn ang="0">
+                <a:pos x="connsiteX7" y="connsiteY7"/>
+              </a:cxn>
+            </a:cxnLst>
+            <a:rect l="l" t="t" r="r" b="b"/>
+            <a:pathLst>
+              <a:path w="12192000" h="6105524">
+                <a:moveTo>
+                  <a:pt x="0" y="0"/>
+                </a:moveTo>
+                <a:lnTo>
+                  <a:pt x="12192000" y="0"/>
+                </a:lnTo>
+                <a:lnTo>
+                  <a:pt x="12192000" y="6105524"/>
+                </a:lnTo>
+                <a:lnTo>
+                  <a:pt x="11435080" y="6105524"/>
+                </a:lnTo>
+                <a:lnTo>
+                  <a:pt x="11435080" y="771523"/>
+                </a:lnTo>
+                <a:lnTo>
+                  <a:pt x="767080" y="771523"/>
+                </a:lnTo>
+                <a:lnTo>
+                  <a:pt x="767080" y="6105524"/>
+                </a:lnTo>
+                <a:lnTo>
+                  <a:pt x="0" y="6105524"/>
+                </a:lnTo>
+                <a:close/>
+              </a:path>
+            </a:pathLst>
+          </a:custGeom>
+          <a:gradFill flip="none" rotWithShape="1">
+            <a:gsLst>
+              <a:gs pos="10000">
+                <a:schemeClr val="accent5"/>
+              </a:gs>
+              <a:gs pos="90000">
+                <a:schemeClr val="accent1"/>
+              </a:gs>
+              <a:gs pos="70000">
+                <a:schemeClr val="accent2"/>
+              </a:gs>
+              <a:gs pos="30000">
+                <a:schemeClr val="accent4"/>
+              </a:gs>
+              <a:gs pos="50000">
+                <a:schemeClr val="accent3">
+                  <a:lumMod val="60000"/>
+                  <a:lumOff val="40000"/>
+                </a:schemeClr>
+              </a:gs>
+            </a:gsLst>
+            <a:lin ang="7200000" scaled="0"/>
+            <a:tileRect/>
+          </a:gradFill>
+          <a:ln>
+            <a:noFill/>
+          </a:ln>
+        </p:spPr>
+        <p:style>
+          <a:lnRef idx="2">
+            <a:schemeClr val="accent1">
+              <a:shade val="50000"/>
+            </a:schemeClr>
+          </a:lnRef>
+          <a:fillRef idx="1">
+            <a:schemeClr val="accent1"/>
+          </a:fillRef>
+          <a:effectRef idx="0">
+            <a:schemeClr val="accent1"/>
+          </a:effectRef>
+          <a:fontRef idx="minor">
+            <a:schemeClr val="lt1"/>
+          </a:fontRef>
+        </p:style>
+        <p:txBody>
+          <a:bodyPr wrap="square" rtlCol="0" anchor="ctr">
+            <a:noAutofit/>
+          </a:bodyPr>
+          <a:lstStyle/>
+          <a:p>
+            <a:pPr algn="ctr"/>
+            <a:endParaRPr lang="en-US"/>
+          </a:p>
+        </p:txBody>
+      </p:sp>
+      <p:pic>
+        <p:nvPicPr>
+          <p:cNvPr id="4" name="Picture 3">
+            <a:extLst>
+              <a:ext uri="{FF2B5EF4-FFF2-40B4-BE49-F238E27FC236}">
+                <a16:creationId xmlns:a16="http://schemas.microsoft.com/office/drawing/2014/main" id="{74F8F6EE-B0BE-FFF1-9B48-F57D6FDB5DFA}"/>
+              </a:ext>
+            </a:extLst>
+          </p:cNvPr>
+          <p:cNvPicPr>
+            <a:picLocks noChangeAspect="1"/>
+          </p:cNvPicPr>
+          <p:nvPr/>
+        </p:nvPicPr>
+        <p:blipFill>
+          <a:blip r:embed="rId2"/>
+          <a:stretch>
+            <a:fillRect/>
+          </a:stretch>
+        </p:blipFill>
+        <p:spPr>
+          <a:xfrm>
+            <a:off x="1591999" y="1401556"/>
+            <a:ext cx="9035296" cy="4698355"/>
+          </a:xfrm>
+          <a:prstGeom prst="rect">
+            <a:avLst/>
+          </a:prstGeom>
+        </p:spPr>
+      </p:pic>
+    </p:spTree>
+    <p:extLst>
+      <p:ext uri="{BB962C8B-B14F-4D97-AF65-F5344CB8AC3E}">
+        <p14:creationId xmlns:p14="http://schemas.microsoft.com/office/powerpoint/2010/main" val="3254856178"/>
+      </p:ext>
+    </p:extLst>
+  </p:cSld>
+  <p:clrMapOvr>
+    <a:masterClrMapping/>
+  </p:clrMapOvr>
+</p:sld>
+</file>
+
+<file path=ppt/slides/slide15.xml><?xml version="1.0" encoding="utf-8"?>
+<p:sld xmlns:a="http://schemas.openxmlformats.org/drawingml/2006/main" xmlns:r="http://schemas.openxmlformats.org/officeDocument/2006/relationships" xmlns:p="http://schemas.openxmlformats.org/presentationml/2006/main">
+  <p:cSld>
+    <p:bg>
+      <p:bgPr>
+        <a:solidFill>
+          <a:schemeClr val="bg1"/>
+        </a:solidFill>
+        <a:effectLst/>
+      </p:bgPr>
+    </p:bg>
+    <p:spTree>
+      <p:nvGrpSpPr>
+        <p:cNvPr id="1" name=""/>
+        <p:cNvGrpSpPr/>
+        <p:nvPr/>
+      </p:nvGrpSpPr>
+      <p:grpSpPr>
+        <a:xfrm>
+          <a:off x="0" y="0"/>
+          <a:ext cx="0" cy="0"/>
+          <a:chOff x="0" y="0"/>
+          <a:chExt cx="0" cy="0"/>
+        </a:xfrm>
+      </p:grpSpPr>
+      <p:sp useBgFill="1">
+        <p:nvSpPr>
           <p:cNvPr id="8" name="Rectangle 7">
             <a:extLst>
               <a:ext uri="{FF2B5EF4-FFF2-40B4-BE49-F238E27FC236}">
@@ -6949,7 +7247,7 @@
 </p:sld>
 </file>
 
-<file path=ppt/slides/slide15.xml><?xml version="1.0" encoding="utf-8"?>
+<file path=ppt/slides/slide16.xml><?xml version="1.0" encoding="utf-8"?>
 <p:sld xmlns:a="http://schemas.openxmlformats.org/drawingml/2006/main" xmlns:r="http://schemas.openxmlformats.org/officeDocument/2006/relationships" xmlns:p="http://schemas.openxmlformats.org/presentationml/2006/main">
   <p:cSld>
     <p:bg>

</xml_diff>